<commit_message>
Pwp + fix poster
</commit_message>
<xml_diff>
--- a/Organização/Ilustrações/poster_PA_LESI.pptx
+++ b/Organização/Ilustrações/poster_PA_LESI.pptx
@@ -3558,8 +3558,8 @@
         </p:nvSpPr>
         <p:spPr>
           <a:xfrm>
-            <a:off x="7689600" y="994680"/>
-            <a:ext cx="12884400" cy="3045534"/>
+            <a:off x="7635960" y="718299"/>
+            <a:ext cx="12884400" cy="3545671"/>
           </a:xfrm>
           <a:prstGeom prst="rect">
             <a:avLst/>
@@ -3676,8 +3676,30 @@
                 </a:solidFill>
                 <a:latin typeface="Calibri"/>
               </a:rPr>
-              <a:t> in Computer Engineering</a:t>
-            </a:r>
+              <a:t> in LESI</a:t>
+            </a:r>
+          </a:p>
+          <a:p>
+            <a:pPr>
+              <a:lnSpc>
+                <a:spcPts val="3900"/>
+              </a:lnSpc>
+            </a:pPr>
+            <a:r>
+              <a:rPr lang="pt-PT" sz="2400" i="1" spc="-1" dirty="0">
+                <a:solidFill>
+                  <a:srgbClr val="004B87"/>
+                </a:solidFill>
+                <a:latin typeface="Calibri"/>
+              </a:rPr>
+              <a:t>UC - PA</a:t>
+            </a:r>
+            <a:endParaRPr lang="pt-PT" sz="2400" b="0" i="1" strike="noStrike" spc="-1" dirty="0">
+              <a:solidFill>
+                <a:srgbClr val="004B87"/>
+              </a:solidFill>
+              <a:latin typeface="Calibri"/>
+            </a:endParaRPr>
           </a:p>
           <a:p>
             <a:pPr>

</xml_diff>